<commit_message>
Hands On Demos - Day 1.
</commit_message>
<xml_diff>
--- a/1. Core Java 8/Day 1/Slides/3. Variables, Data Types, and Math Operators/variables-data-types-and-math-operators-slides.pptx
+++ b/1. Core Java 8/Day 1/Slides/3. Variables, Data Types, and Math Operators/variables-data-types-and-math-operators-slides.pptx
@@ -5,37 +5,37 @@
     <p:sldMasterId id="2147483648" r:id="rId1"/>
   </p:sldMasterIdLst>
   <p:notesMasterIdLst>
-    <p:notesMasterId r:id="rId31"/>
+    <p:notesMasterId r:id="rId7"/>
   </p:notesMasterIdLst>
   <p:sldIdLst>
     <p:sldId id="256" r:id="rId3"/>
     <p:sldId id="257" r:id="rId4"/>
     <p:sldId id="258" r:id="rId5"/>
     <p:sldId id="259" r:id="rId6"/>
-    <p:sldId id="260" r:id="rId7"/>
-    <p:sldId id="261" r:id="rId8"/>
-    <p:sldId id="262" r:id="rId9"/>
-    <p:sldId id="263" r:id="rId10"/>
-    <p:sldId id="264" r:id="rId11"/>
-    <p:sldId id="265" r:id="rId12"/>
-    <p:sldId id="266" r:id="rId13"/>
-    <p:sldId id="267" r:id="rId14"/>
-    <p:sldId id="268" r:id="rId15"/>
-    <p:sldId id="269" r:id="rId16"/>
-    <p:sldId id="270" r:id="rId17"/>
-    <p:sldId id="271" r:id="rId18"/>
-    <p:sldId id="272" r:id="rId19"/>
-    <p:sldId id="273" r:id="rId20"/>
-    <p:sldId id="274" r:id="rId21"/>
-    <p:sldId id="275" r:id="rId22"/>
-    <p:sldId id="276" r:id="rId23"/>
-    <p:sldId id="277" r:id="rId24"/>
-    <p:sldId id="278" r:id="rId25"/>
-    <p:sldId id="279" r:id="rId26"/>
-    <p:sldId id="280" r:id="rId27"/>
-    <p:sldId id="281" r:id="rId28"/>
-    <p:sldId id="282" r:id="rId29"/>
-    <p:sldId id="283" r:id="rId30"/>
+    <p:sldId id="260" r:id="rId8"/>
+    <p:sldId id="261" r:id="rId9"/>
+    <p:sldId id="262" r:id="rId10"/>
+    <p:sldId id="263" r:id="rId11"/>
+    <p:sldId id="264" r:id="rId12"/>
+    <p:sldId id="265" r:id="rId13"/>
+    <p:sldId id="266" r:id="rId14"/>
+    <p:sldId id="267" r:id="rId15"/>
+    <p:sldId id="268" r:id="rId16"/>
+    <p:sldId id="269" r:id="rId17"/>
+    <p:sldId id="270" r:id="rId18"/>
+    <p:sldId id="271" r:id="rId19"/>
+    <p:sldId id="272" r:id="rId20"/>
+    <p:sldId id="273" r:id="rId21"/>
+    <p:sldId id="274" r:id="rId22"/>
+    <p:sldId id="275" r:id="rId23"/>
+    <p:sldId id="276" r:id="rId24"/>
+    <p:sldId id="277" r:id="rId25"/>
+    <p:sldId id="278" r:id="rId26"/>
+    <p:sldId id="279" r:id="rId27"/>
+    <p:sldId id="280" r:id="rId28"/>
+    <p:sldId id="281" r:id="rId29"/>
+    <p:sldId id="282" r:id="rId30"/>
+    <p:sldId id="283" r:id="rId31"/>
   </p:sldIdLst>
   <p:sldSz cx="12192000" cy="6858000"/>
   <p:notesSz cx="12192000" cy="6858000"/>
@@ -479,6 +479,50 @@
     </a:lvl9pPr>
   </p:notesStyle>
 </p:notesMaster>
+</file>
+
+<file path=ppt/notesSlides/notesSlide1.xml><?xml version="1.0" encoding="utf-8"?>
+<p:notes xmlns:a="http://schemas.openxmlformats.org/drawingml/2006/main" xmlns:r="http://schemas.openxmlformats.org/officeDocument/2006/relationships" xmlns:p="http://schemas.openxmlformats.org/presentationml/2006/main">
+  <p:cSld>
+    <p:spTree>
+      <p:nvGrpSpPr>
+        <p:cNvPr id="1" name=""/>
+        <p:cNvGrpSpPr/>
+        <p:nvPr/>
+      </p:nvGrpSpPr>
+      <p:grpSpPr/>
+      <p:sp>
+        <p:nvSpPr>
+          <p:cNvPr id="2" name="Slide Image Placeholder 1"/>
+          <p:cNvSpPr/>
+          <p:nvPr>
+            <p:ph type="sldImg" idx="2"/>
+          </p:nvPr>
+        </p:nvSpPr>
+        <p:spPr/>
+      </p:sp>
+      <p:sp>
+        <p:nvSpPr>
+          <p:cNvPr id="3" name="Text Placeholder 2"/>
+          <p:cNvSpPr/>
+          <p:nvPr>
+            <p:ph type="body" idx="3"/>
+          </p:nvPr>
+        </p:nvSpPr>
+        <p:spPr/>
+        <p:txBody>
+          <a:bodyPr/>
+          <a:p>
+            <a:endParaRPr lang="en-US"/>
+          </a:p>
+        </p:txBody>
+      </p:sp>
+    </p:spTree>
+  </p:cSld>
+  <p:clrMapOvr>
+    <a:masterClrMapping/>
+  </p:clrMapOvr>
+</p:notes>
 </file>
 
 <file path=ppt/slideLayouts/slideLayout1.xml><?xml version="1.0" encoding="utf-8"?>
@@ -3294,54 +3338,6 @@
       </p:pic>
       <p:sp>
         <p:nvSpPr>
-          <p:cNvPr id="32" name="object 32"/>
-          <p:cNvSpPr/>
-          <p:nvPr/>
-        </p:nvSpPr>
-        <p:spPr>
-          <a:xfrm>
-            <a:off x="426719" y="6060947"/>
-            <a:ext cx="11026140" cy="485140"/>
-          </a:xfrm>
-          <a:custGeom>
-            <a:avLst/>
-            <a:gdLst/>
-            <a:ahLst/>
-            <a:cxnLst/>
-            <a:rect l="l" t="t" r="r" b="b"/>
-            <a:pathLst>
-              <a:path w="11026140" h="485140">
-                <a:moveTo>
-                  <a:pt x="11026140" y="0"/>
-                </a:moveTo>
-                <a:lnTo>
-                  <a:pt x="0" y="0"/>
-                </a:lnTo>
-                <a:lnTo>
-                  <a:pt x="0" y="484631"/>
-                </a:lnTo>
-                <a:lnTo>
-                  <a:pt x="11026140" y="484631"/>
-                </a:lnTo>
-                <a:lnTo>
-                  <a:pt x="11026140" y="0"/>
-                </a:lnTo>
-                <a:close/>
-              </a:path>
-            </a:pathLst>
-          </a:custGeom>
-          <a:solidFill>
-            <a:srgbClr val="FFFFFF"/>
-          </a:solidFill>
-        </p:spPr>
-        <p:txBody>
-          <a:bodyPr wrap="square" lIns="0" tIns="0" rIns="0" bIns="0" rtlCol="0"/>
-          <a:lstStyle/>
-          <a:p/>
-        </p:txBody>
-      </p:sp>
-      <p:sp>
-        <p:nvSpPr>
           <p:cNvPr id="33" name="Slide Number Placeholder 32"/>
           <p:cNvSpPr>
             <a:spLocks noGrp="1"/>
@@ -3442,7 +3438,7 @@
         </p:nvSpPr>
         <p:spPr>
           <a:xfrm>
-            <a:off x="362204" y="1636522"/>
+            <a:off x="381254" y="1600327"/>
             <a:ext cx="4750435" cy="864869"/>
           </a:xfrm>
           <a:prstGeom prst="rect">
@@ -4515,8 +4511,8 @@
         </p:nvSpPr>
         <p:spPr>
           <a:xfrm>
-            <a:off x="4270247" y="5291328"/>
-            <a:ext cx="1005840" cy="1005840"/>
+            <a:off x="4270882" y="5283708"/>
+            <a:ext cx="1005840" cy="675005"/>
           </a:xfrm>
           <a:prstGeom prst="rect">
             <a:avLst/>
@@ -4540,16 +4536,19 @@
               </a:spcBef>
             </a:pPr>
             <a:r>
-              <a:rPr sz="2400" spc="-585" dirty="0">
+              <a:rPr lang="en-US" sz="2400" spc="-585" dirty="0">
                 <a:solidFill>
                   <a:srgbClr val="FFFFFF"/>
                 </a:solidFill>
                 <a:latin typeface="Courier New" panose="02070309020205020404"/>
                 <a:cs typeface="Courier New" panose="02070309020205020404"/>
               </a:rPr>
-              <a:t>17000</a:t>
-            </a:r>
-            <a:endParaRPr sz="2400">
+              <a:t>100</a:t>
+            </a:r>
+            <a:endParaRPr lang="en-US" sz="2400" spc="-585" dirty="0">
+              <a:solidFill>
+                <a:srgbClr val="FFFFFF"/>
+              </a:solidFill>
               <a:latin typeface="Courier New" panose="02070309020205020404"/>
               <a:cs typeface="Courier New" panose="02070309020205020404"/>
             </a:endParaRPr>
@@ -4564,8 +4563,8 @@
         </p:nvSpPr>
         <p:spPr>
           <a:xfrm>
-            <a:off x="6915911" y="5291328"/>
-            <a:ext cx="1005840" cy="1005840"/>
+            <a:off x="7010526" y="5283708"/>
+            <a:ext cx="1005840" cy="675005"/>
           </a:xfrm>
           <a:prstGeom prst="rect">
             <a:avLst/>
@@ -4589,56 +4588,16 @@
               </a:spcBef>
             </a:pPr>
             <a:r>
-              <a:rPr sz="2400" spc="-585" dirty="0">
+              <a:rPr lang="en-US" sz="2400" spc="-585" dirty="0">
                 <a:solidFill>
                   <a:srgbClr val="FFFFFF"/>
                 </a:solidFill>
                 <a:latin typeface="Courier New" panose="02070309020205020404"/>
                 <a:cs typeface="Courier New" panose="02070309020205020404"/>
               </a:rPr>
-              <a:t>1</a:t>
-            </a:r>
-            <a:r>
-              <a:rPr sz="3600" spc="-877" baseline="1000" dirty="0">
-                <a:solidFill>
-                  <a:srgbClr val="FFFFFF"/>
-                </a:solidFill>
-                <a:latin typeface="Courier New" panose="02070309020205020404"/>
-                <a:cs typeface="Courier New" panose="02070309020205020404"/>
-              </a:rPr>
-              <a:t>5</a:t>
-            </a:r>
-            <a:r>
-              <a:rPr sz="2400" spc="-585" dirty="0">
-                <a:solidFill>
-                  <a:srgbClr val="FFFFFF"/>
-                </a:solidFill>
-                <a:latin typeface="Courier New" panose="02070309020205020404"/>
-                <a:cs typeface="Courier New" panose="02070309020205020404"/>
-              </a:rPr>
-              <a:t>0</a:t>
-            </a:r>
-            <a:r>
-              <a:rPr sz="3600" spc="-877" baseline="1000" dirty="0">
-                <a:solidFill>
-                  <a:srgbClr val="FFFFFF"/>
-                </a:solidFill>
-                <a:latin typeface="Courier New" panose="02070309020205020404"/>
-                <a:cs typeface="Courier New" panose="02070309020205020404"/>
-              </a:rPr>
-              <a:t>0</a:t>
-            </a:r>
-            <a:r>
-              <a:rPr sz="2400" spc="-585" dirty="0">
-                <a:solidFill>
-                  <a:srgbClr val="FFFFFF"/>
-                </a:solidFill>
-                <a:latin typeface="Courier New" panose="02070309020205020404"/>
-                <a:cs typeface="Courier New" panose="02070309020205020404"/>
-              </a:rPr>
-              <a:t>0</a:t>
-            </a:r>
-            <a:endParaRPr sz="2400">
+              <a:t>100</a:t>
+            </a:r>
+            <a:endParaRPr lang="en-US" sz="2400">
               <a:latin typeface="Courier New" panose="02070309020205020404"/>
               <a:cs typeface="Courier New" panose="02070309020205020404"/>
             </a:endParaRPr>
@@ -4653,7 +4612,7 @@
         </p:nvSpPr>
         <p:spPr>
           <a:xfrm>
-            <a:off x="5515355" y="5526023"/>
+            <a:off x="5515355" y="5373623"/>
             <a:ext cx="1161415" cy="521334"/>
           </a:xfrm>
           <a:custGeom>
@@ -4712,7 +4671,12 @@
             <p:ph type="sldNum" sz="quarter" idx="7"/>
           </p:nvPr>
         </p:nvSpPr>
-        <p:spPr/>
+        <p:spPr>
+          <a:xfrm>
+            <a:off x="8763000" y="6324600"/>
+            <a:ext cx="2804160" cy="342900"/>
+          </a:xfrm>
+        </p:spPr>
         <p:txBody>
           <a:bodyPr/>
           <a:p>
@@ -4720,6 +4684,105 @@
               <a:rPr/>
             </a:fld>
             <a:endParaRPr/>
+          </a:p>
+        </p:txBody>
+      </p:sp>
+      <p:sp>
+        <p:nvSpPr>
+          <p:cNvPr id="11" name="object 8"/>
+          <p:cNvSpPr txBox="1"/>
+          <p:nvPr/>
+        </p:nvSpPr>
+        <p:spPr>
+          <a:xfrm>
+            <a:off x="7010526" y="6045708"/>
+            <a:ext cx="1005840" cy="675005"/>
+          </a:xfrm>
+          <a:prstGeom prst="rect">
+            <a:avLst/>
+          </a:prstGeom>
+          <a:solidFill>
+            <a:srgbClr val="EF5A28"/>
+          </a:solidFill>
+        </p:spPr>
+        <p:txBody>
+          <a:bodyPr vert="horz" wrap="square" lIns="0" tIns="306070" rIns="0" bIns="0" rtlCol="0">
+            <a:spAutoFit/>
+          </a:bodyPr>
+          <a:p>
+            <a:pPr marL="229870">
+              <a:lnSpc>
+                <a:spcPct val="100000"/>
+              </a:lnSpc>
+              <a:spcBef>
+                <a:spcPts val="2410"/>
+              </a:spcBef>
+            </a:pPr>
+            <a:r>
+              <a:rPr lang="en-US" sz="2400" spc="-585" dirty="0">
+                <a:solidFill>
+                  <a:srgbClr val="FFFFFF"/>
+                </a:solidFill>
+                <a:latin typeface="Courier New" panose="02070309020205020404"/>
+                <a:cs typeface="Courier New" panose="02070309020205020404"/>
+              </a:rPr>
+              <a:t>50</a:t>
+            </a:r>
+            <a:endParaRPr lang="en-US" sz="2400">
+              <a:latin typeface="Courier New" panose="02070309020205020404"/>
+              <a:cs typeface="Courier New" panose="02070309020205020404"/>
+            </a:endParaRPr>
+          </a:p>
+        </p:txBody>
+      </p:sp>
+      <p:sp>
+        <p:nvSpPr>
+          <p:cNvPr id="12" name="object 7"/>
+          <p:cNvSpPr txBox="1"/>
+          <p:nvPr/>
+        </p:nvSpPr>
+        <p:spPr>
+          <a:xfrm>
+            <a:off x="4267072" y="6055233"/>
+            <a:ext cx="1005840" cy="675005"/>
+          </a:xfrm>
+          <a:prstGeom prst="rect">
+            <a:avLst/>
+          </a:prstGeom>
+          <a:solidFill>
+            <a:srgbClr val="2A9FBB"/>
+          </a:solidFill>
+        </p:spPr>
+        <p:txBody>
+          <a:bodyPr vert="horz" wrap="square" lIns="0" tIns="306070" rIns="0" bIns="0" rtlCol="0">
+            <a:spAutoFit/>
+          </a:bodyPr>
+          <a:p>
+            <a:pPr marL="228600">
+              <a:lnSpc>
+                <a:spcPct val="100000"/>
+              </a:lnSpc>
+              <a:spcBef>
+                <a:spcPts val="2410"/>
+              </a:spcBef>
+            </a:pPr>
+            <a:r>
+              <a:rPr lang="en-US" sz="2400" spc="-585" dirty="0">
+                <a:solidFill>
+                  <a:srgbClr val="FFFFFF"/>
+                </a:solidFill>
+                <a:latin typeface="Courier New" panose="02070309020205020404"/>
+                <a:cs typeface="Courier New" panose="02070309020205020404"/>
+              </a:rPr>
+              <a:t>70</a:t>
+            </a:r>
+            <a:endParaRPr lang="en-US" sz="2400" spc="-585" dirty="0">
+              <a:solidFill>
+                <a:srgbClr val="FFFFFF"/>
+              </a:solidFill>
+              <a:latin typeface="Courier New" panose="02070309020205020404"/>
+              <a:cs typeface="Courier New" panose="02070309020205020404"/>
+            </a:endParaRPr>
           </a:p>
         </p:txBody>
       </p:sp>

</xml_diff>